<commit_message>
edits part 1 103021
</commit_message>
<xml_diff>
--- a/docs/images/urban-io-aws-iot-sitewise-architecture-diagram.pptx
+++ b/docs/images/urban-io-aws-iot-sitewise-architecture-diagram.pptx
@@ -262,7 +262,7 @@
           <a:p>
             <a:fld id="{2AFC4144-3B10-41AD-8FFF-1FE848580B94}" type="datetimeFigureOut">
               <a:rPr lang="en-US" smtClean="0"/>
-              <a:t>10/27/2021</a:t>
+              <a:t>10/29/2021</a:t>
             </a:fld>
             <a:endParaRPr lang="en-US"/>
           </a:p>
@@ -432,7 +432,7 @@
           <a:p>
             <a:fld id="{2AFC4144-3B10-41AD-8FFF-1FE848580B94}" type="datetimeFigureOut">
               <a:rPr lang="en-US" smtClean="0"/>
-              <a:t>10/27/2021</a:t>
+              <a:t>10/29/2021</a:t>
             </a:fld>
             <a:endParaRPr lang="en-US"/>
           </a:p>
@@ -612,7 +612,7 @@
           <a:p>
             <a:fld id="{2AFC4144-3B10-41AD-8FFF-1FE848580B94}" type="datetimeFigureOut">
               <a:rPr lang="en-US" smtClean="0"/>
-              <a:t>10/27/2021</a:t>
+              <a:t>10/29/2021</a:t>
             </a:fld>
             <a:endParaRPr lang="en-US"/>
           </a:p>
@@ -782,7 +782,7 @@
           <a:p>
             <a:fld id="{2AFC4144-3B10-41AD-8FFF-1FE848580B94}" type="datetimeFigureOut">
               <a:rPr lang="en-US" smtClean="0"/>
-              <a:t>10/27/2021</a:t>
+              <a:t>10/29/2021</a:t>
             </a:fld>
             <a:endParaRPr lang="en-US"/>
           </a:p>
@@ -1028,7 +1028,7 @@
           <a:p>
             <a:fld id="{2AFC4144-3B10-41AD-8FFF-1FE848580B94}" type="datetimeFigureOut">
               <a:rPr lang="en-US" smtClean="0"/>
-              <a:t>10/27/2021</a:t>
+              <a:t>10/29/2021</a:t>
             </a:fld>
             <a:endParaRPr lang="en-US"/>
           </a:p>
@@ -1260,7 +1260,7 @@
           <a:p>
             <a:fld id="{2AFC4144-3B10-41AD-8FFF-1FE848580B94}" type="datetimeFigureOut">
               <a:rPr lang="en-US" smtClean="0"/>
-              <a:t>10/27/2021</a:t>
+              <a:t>10/29/2021</a:t>
             </a:fld>
             <a:endParaRPr lang="en-US"/>
           </a:p>
@@ -1627,7 +1627,7 @@
           <a:p>
             <a:fld id="{2AFC4144-3B10-41AD-8FFF-1FE848580B94}" type="datetimeFigureOut">
               <a:rPr lang="en-US" smtClean="0"/>
-              <a:t>10/27/2021</a:t>
+              <a:t>10/29/2021</a:t>
             </a:fld>
             <a:endParaRPr lang="en-US"/>
           </a:p>
@@ -1745,7 +1745,7 @@
           <a:p>
             <a:fld id="{2AFC4144-3B10-41AD-8FFF-1FE848580B94}" type="datetimeFigureOut">
               <a:rPr lang="en-US" smtClean="0"/>
-              <a:t>10/27/2021</a:t>
+              <a:t>10/29/2021</a:t>
             </a:fld>
             <a:endParaRPr lang="en-US"/>
           </a:p>
@@ -1840,7 +1840,7 @@
           <a:p>
             <a:fld id="{2AFC4144-3B10-41AD-8FFF-1FE848580B94}" type="datetimeFigureOut">
               <a:rPr lang="en-US" smtClean="0"/>
-              <a:t>10/27/2021</a:t>
+              <a:t>10/29/2021</a:t>
             </a:fld>
             <a:endParaRPr lang="en-US"/>
           </a:p>
@@ -2117,7 +2117,7 @@
           <a:p>
             <a:fld id="{2AFC4144-3B10-41AD-8FFF-1FE848580B94}" type="datetimeFigureOut">
               <a:rPr lang="en-US" smtClean="0"/>
-              <a:t>10/27/2021</a:t>
+              <a:t>10/29/2021</a:t>
             </a:fld>
             <a:endParaRPr lang="en-US"/>
           </a:p>
@@ -2374,7 +2374,7 @@
           <a:p>
             <a:fld id="{2AFC4144-3B10-41AD-8FFF-1FE848580B94}" type="datetimeFigureOut">
               <a:rPr lang="en-US" smtClean="0"/>
-              <a:t>10/27/2021</a:t>
+              <a:t>10/29/2021</a:t>
             </a:fld>
             <a:endParaRPr lang="en-US"/>
           </a:p>
@@ -2587,7 +2587,7 @@
           <a:p>
             <a:fld id="{2AFC4144-3B10-41AD-8FFF-1FE848580B94}" type="datetimeFigureOut">
               <a:rPr lang="en-US" smtClean="0"/>
-              <a:t>10/27/2021</a:t>
+              <a:t>10/29/2021</a:t>
             </a:fld>
             <a:endParaRPr lang="en-US"/>
           </a:p>
@@ -30074,8 +30074,8 @@
         </p:nvSpPr>
         <p:spPr>
           <a:xfrm rot="5400000">
-            <a:off x="5554379" y="3762891"/>
-            <a:ext cx="761999" cy="1388042"/>
+            <a:off x="5579515" y="3796281"/>
+            <a:ext cx="770251" cy="1329515"/>
           </a:xfrm>
           <a:custGeom>
             <a:avLst/>

</xml_diff>